<commit_message>
added sampling, updated presentation
</commit_message>
<xml_diff>
--- a/prezka.pptx
+++ b/prezka.pptx
@@ -4,17 +4,22 @@
   <p:sldMasterIdLst>
     <p:sldMasterId id="2147483697" r:id="rId1"/>
   </p:sldMasterIdLst>
+  <p:notesMasterIdLst>
+    <p:notesMasterId r:id="rId14"/>
+  </p:notesMasterIdLst>
   <p:sldIdLst>
     <p:sldId id="256" r:id="rId2"/>
     <p:sldId id="257" r:id="rId3"/>
     <p:sldId id="258" r:id="rId4"/>
     <p:sldId id="259" r:id="rId5"/>
-    <p:sldId id="260" r:id="rId6"/>
-    <p:sldId id="261" r:id="rId7"/>
-    <p:sldId id="266" r:id="rId8"/>
-    <p:sldId id="262" r:id="rId9"/>
-    <p:sldId id="263" r:id="rId10"/>
-    <p:sldId id="265" r:id="rId11"/>
+    <p:sldId id="270" r:id="rId6"/>
+    <p:sldId id="266" r:id="rId7"/>
+    <p:sldId id="262" r:id="rId8"/>
+    <p:sldId id="263" r:id="rId9"/>
+    <p:sldId id="269" r:id="rId10"/>
+    <p:sldId id="268" r:id="rId11"/>
+    <p:sldId id="267" r:id="rId12"/>
+    <p:sldId id="265" r:id="rId13"/>
   </p:sldIdLst>
   <p:sldSz cx="12192000" cy="6858000"/>
   <p:notesSz cx="6858000" cy="9144000"/>
@@ -119,6 +124,871 @@
     </p:ext>
   </p:extLst>
 </p:presentation>
+</file>
+
+<file path=ppt/notesMasters/notesMaster1.xml><?xml version="1.0" encoding="utf-8"?>
+<p:notesMaster xmlns:a="http://schemas.openxmlformats.org/drawingml/2006/main" xmlns:r="http://schemas.openxmlformats.org/officeDocument/2006/relationships" xmlns:p="http://schemas.openxmlformats.org/presentationml/2006/main">
+  <p:cSld>
+    <p:bg>
+      <p:bgRef idx="1001">
+        <a:schemeClr val="bg1"/>
+      </p:bgRef>
+    </p:bg>
+    <p:spTree>
+      <p:nvGrpSpPr>
+        <p:cNvPr id="1" name=""/>
+        <p:cNvGrpSpPr/>
+        <p:nvPr/>
+      </p:nvGrpSpPr>
+      <p:grpSpPr>
+        <a:xfrm>
+          <a:off x="0" y="0"/>
+          <a:ext cx="0" cy="0"/>
+          <a:chOff x="0" y="0"/>
+          <a:chExt cx="0" cy="0"/>
+        </a:xfrm>
+      </p:grpSpPr>
+      <p:sp>
+        <p:nvSpPr>
+          <p:cNvPr id="2" name="Symbol zastępczy nagłówka 1"/>
+          <p:cNvSpPr>
+            <a:spLocks noGrp="1"/>
+          </p:cNvSpPr>
+          <p:nvPr>
+            <p:ph type="hdr" sz="quarter"/>
+          </p:nvPr>
+        </p:nvSpPr>
+        <p:spPr>
+          <a:xfrm>
+            <a:off x="0" y="0"/>
+            <a:ext cx="2971800" cy="458788"/>
+          </a:xfrm>
+          <a:prstGeom prst="rect">
+            <a:avLst/>
+          </a:prstGeom>
+        </p:spPr>
+        <p:txBody>
+          <a:bodyPr vert="horz" lIns="91440" tIns="45720" rIns="91440" bIns="45720" rtlCol="0"/>
+          <a:lstStyle>
+            <a:lvl1pPr algn="l">
+              <a:defRPr sz="1200"/>
+            </a:lvl1pPr>
+          </a:lstStyle>
+          <a:p>
+            <a:endParaRPr lang="pl-PL"/>
+          </a:p>
+        </p:txBody>
+      </p:sp>
+      <p:sp>
+        <p:nvSpPr>
+          <p:cNvPr id="3" name="Symbol zastępczy daty 2"/>
+          <p:cNvSpPr>
+            <a:spLocks noGrp="1"/>
+          </p:cNvSpPr>
+          <p:nvPr>
+            <p:ph type="dt" idx="1"/>
+          </p:nvPr>
+        </p:nvSpPr>
+        <p:spPr>
+          <a:xfrm>
+            <a:off x="3884613" y="0"/>
+            <a:ext cx="2971800" cy="458788"/>
+          </a:xfrm>
+          <a:prstGeom prst="rect">
+            <a:avLst/>
+          </a:prstGeom>
+        </p:spPr>
+        <p:txBody>
+          <a:bodyPr vert="horz" lIns="91440" tIns="45720" rIns="91440" bIns="45720" rtlCol="0"/>
+          <a:lstStyle>
+            <a:lvl1pPr algn="r">
+              <a:defRPr sz="1200"/>
+            </a:lvl1pPr>
+          </a:lstStyle>
+          <a:p>
+            <a:fld id="{244F743C-CD00-4FD4-81BB-815A4BFC48DA}" type="datetimeFigureOut">
+              <a:rPr lang="pl-PL" smtClean="0"/>
+              <a:t>16.05.2023</a:t>
+            </a:fld>
+            <a:endParaRPr lang="pl-PL"/>
+          </a:p>
+        </p:txBody>
+      </p:sp>
+      <p:sp>
+        <p:nvSpPr>
+          <p:cNvPr id="4" name="Symbol zastępczy obrazu slajdu 3"/>
+          <p:cNvSpPr>
+            <a:spLocks noGrp="1" noRot="1" noChangeAspect="1"/>
+          </p:cNvSpPr>
+          <p:nvPr>
+            <p:ph type="sldImg" idx="2"/>
+          </p:nvPr>
+        </p:nvSpPr>
+        <p:spPr>
+          <a:xfrm>
+            <a:off x="685800" y="1143000"/>
+            <a:ext cx="5486400" cy="3086100"/>
+          </a:xfrm>
+          <a:prstGeom prst="rect">
+            <a:avLst/>
+          </a:prstGeom>
+          <a:noFill/>
+          <a:ln w="12700">
+            <a:solidFill>
+              <a:prstClr val="black"/>
+            </a:solidFill>
+          </a:ln>
+        </p:spPr>
+        <p:txBody>
+          <a:bodyPr vert="horz" lIns="91440" tIns="45720" rIns="91440" bIns="45720" rtlCol="0" anchor="ctr"/>
+          <a:lstStyle/>
+          <a:p>
+            <a:endParaRPr lang="pl-PL"/>
+          </a:p>
+        </p:txBody>
+      </p:sp>
+      <p:sp>
+        <p:nvSpPr>
+          <p:cNvPr id="5" name="Symbol zastępczy notatek 4"/>
+          <p:cNvSpPr>
+            <a:spLocks noGrp="1"/>
+          </p:cNvSpPr>
+          <p:nvPr>
+            <p:ph type="body" sz="quarter" idx="3"/>
+          </p:nvPr>
+        </p:nvSpPr>
+        <p:spPr>
+          <a:xfrm>
+            <a:off x="685800" y="4400550"/>
+            <a:ext cx="5486400" cy="3600450"/>
+          </a:xfrm>
+          <a:prstGeom prst="rect">
+            <a:avLst/>
+          </a:prstGeom>
+        </p:spPr>
+        <p:txBody>
+          <a:bodyPr vert="horz" lIns="91440" tIns="45720" rIns="91440" bIns="45720" rtlCol="0"/>
+          <a:lstStyle/>
+          <a:p>
+            <a:pPr lvl="0"/>
+            <a:r>
+              <a:rPr lang="pl-PL"/>
+              <a:t>Kliknij, aby edytować style wzorca tekstu</a:t>
+            </a:r>
+          </a:p>
+          <a:p>
+            <a:pPr lvl="1"/>
+            <a:r>
+              <a:rPr lang="pl-PL"/>
+              <a:t>Drugi poziom</a:t>
+            </a:r>
+          </a:p>
+          <a:p>
+            <a:pPr lvl="2"/>
+            <a:r>
+              <a:rPr lang="pl-PL"/>
+              <a:t>Trzeci poziom</a:t>
+            </a:r>
+          </a:p>
+          <a:p>
+            <a:pPr lvl="3"/>
+            <a:r>
+              <a:rPr lang="pl-PL"/>
+              <a:t>Czwarty poziom</a:t>
+            </a:r>
+          </a:p>
+          <a:p>
+            <a:pPr lvl="4"/>
+            <a:r>
+              <a:rPr lang="pl-PL"/>
+              <a:t>Piąty poziom</a:t>
+            </a:r>
+          </a:p>
+        </p:txBody>
+      </p:sp>
+      <p:sp>
+        <p:nvSpPr>
+          <p:cNvPr id="6" name="Symbol zastępczy stopki 5"/>
+          <p:cNvSpPr>
+            <a:spLocks noGrp="1"/>
+          </p:cNvSpPr>
+          <p:nvPr>
+            <p:ph type="ftr" sz="quarter" idx="4"/>
+          </p:nvPr>
+        </p:nvSpPr>
+        <p:spPr>
+          <a:xfrm>
+            <a:off x="0" y="8685213"/>
+            <a:ext cx="2971800" cy="458787"/>
+          </a:xfrm>
+          <a:prstGeom prst="rect">
+            <a:avLst/>
+          </a:prstGeom>
+        </p:spPr>
+        <p:txBody>
+          <a:bodyPr vert="horz" lIns="91440" tIns="45720" rIns="91440" bIns="45720" rtlCol="0" anchor="b"/>
+          <a:lstStyle>
+            <a:lvl1pPr algn="l">
+              <a:defRPr sz="1200"/>
+            </a:lvl1pPr>
+          </a:lstStyle>
+          <a:p>
+            <a:endParaRPr lang="pl-PL"/>
+          </a:p>
+        </p:txBody>
+      </p:sp>
+      <p:sp>
+        <p:nvSpPr>
+          <p:cNvPr id="7" name="Symbol zastępczy numeru slajdu 6"/>
+          <p:cNvSpPr>
+            <a:spLocks noGrp="1"/>
+          </p:cNvSpPr>
+          <p:nvPr>
+            <p:ph type="sldNum" sz="quarter" idx="5"/>
+          </p:nvPr>
+        </p:nvSpPr>
+        <p:spPr>
+          <a:xfrm>
+            <a:off x="3884613" y="8685213"/>
+            <a:ext cx="2971800" cy="458787"/>
+          </a:xfrm>
+          <a:prstGeom prst="rect">
+            <a:avLst/>
+          </a:prstGeom>
+        </p:spPr>
+        <p:txBody>
+          <a:bodyPr vert="horz" lIns="91440" tIns="45720" rIns="91440" bIns="45720" rtlCol="0" anchor="b"/>
+          <a:lstStyle>
+            <a:lvl1pPr algn="r">
+              <a:defRPr sz="1200"/>
+            </a:lvl1pPr>
+          </a:lstStyle>
+          <a:p>
+            <a:fld id="{13251115-DB67-4158-A929-62B97692118A}" type="slidenum">
+              <a:rPr lang="pl-PL" smtClean="0"/>
+              <a:t>‹#›</a:t>
+            </a:fld>
+            <a:endParaRPr lang="pl-PL"/>
+          </a:p>
+        </p:txBody>
+      </p:sp>
+    </p:spTree>
+    <p:extLst>
+      <p:ext uri="{BB962C8B-B14F-4D97-AF65-F5344CB8AC3E}">
+        <p14:creationId xmlns:p14="http://schemas.microsoft.com/office/powerpoint/2010/main" val="794936583"/>
+      </p:ext>
+    </p:extLst>
+  </p:cSld>
+  <p:clrMap bg1="lt1" tx1="dk1" bg2="lt2" tx2="dk2" accent1="accent1" accent2="accent2" accent3="accent3" accent4="accent4" accent5="accent5" accent6="accent6" hlink="hlink" folHlink="folHlink"/>
+  <p:notesStyle>
+    <a:lvl1pPr marL="0" algn="l" defTabSz="914400" rtl="0" eaLnBrk="1" latinLnBrk="0" hangingPunct="1">
+      <a:defRPr sz="1200" kern="1200">
+        <a:solidFill>
+          <a:schemeClr val="tx1"/>
+        </a:solidFill>
+        <a:latin typeface="+mn-lt"/>
+        <a:ea typeface="+mn-ea"/>
+        <a:cs typeface="+mn-cs"/>
+      </a:defRPr>
+    </a:lvl1pPr>
+    <a:lvl2pPr marL="457200" algn="l" defTabSz="914400" rtl="0" eaLnBrk="1" latinLnBrk="0" hangingPunct="1">
+      <a:defRPr sz="1200" kern="1200">
+        <a:solidFill>
+          <a:schemeClr val="tx1"/>
+        </a:solidFill>
+        <a:latin typeface="+mn-lt"/>
+        <a:ea typeface="+mn-ea"/>
+        <a:cs typeface="+mn-cs"/>
+      </a:defRPr>
+    </a:lvl2pPr>
+    <a:lvl3pPr marL="914400" algn="l" defTabSz="914400" rtl="0" eaLnBrk="1" latinLnBrk="0" hangingPunct="1">
+      <a:defRPr sz="1200" kern="1200">
+        <a:solidFill>
+          <a:schemeClr val="tx1"/>
+        </a:solidFill>
+        <a:latin typeface="+mn-lt"/>
+        <a:ea typeface="+mn-ea"/>
+        <a:cs typeface="+mn-cs"/>
+      </a:defRPr>
+    </a:lvl3pPr>
+    <a:lvl4pPr marL="1371600" algn="l" defTabSz="914400" rtl="0" eaLnBrk="1" latinLnBrk="0" hangingPunct="1">
+      <a:defRPr sz="1200" kern="1200">
+        <a:solidFill>
+          <a:schemeClr val="tx1"/>
+        </a:solidFill>
+        <a:latin typeface="+mn-lt"/>
+        <a:ea typeface="+mn-ea"/>
+        <a:cs typeface="+mn-cs"/>
+      </a:defRPr>
+    </a:lvl4pPr>
+    <a:lvl5pPr marL="1828800" algn="l" defTabSz="914400" rtl="0" eaLnBrk="1" latinLnBrk="0" hangingPunct="1">
+      <a:defRPr sz="1200" kern="1200">
+        <a:solidFill>
+          <a:schemeClr val="tx1"/>
+        </a:solidFill>
+        <a:latin typeface="+mn-lt"/>
+        <a:ea typeface="+mn-ea"/>
+        <a:cs typeface="+mn-cs"/>
+      </a:defRPr>
+    </a:lvl5pPr>
+    <a:lvl6pPr marL="2286000" algn="l" defTabSz="914400" rtl="0" eaLnBrk="1" latinLnBrk="0" hangingPunct="1">
+      <a:defRPr sz="1200" kern="1200">
+        <a:solidFill>
+          <a:schemeClr val="tx1"/>
+        </a:solidFill>
+        <a:latin typeface="+mn-lt"/>
+        <a:ea typeface="+mn-ea"/>
+        <a:cs typeface="+mn-cs"/>
+      </a:defRPr>
+    </a:lvl6pPr>
+    <a:lvl7pPr marL="2743200" algn="l" defTabSz="914400" rtl="0" eaLnBrk="1" latinLnBrk="0" hangingPunct="1">
+      <a:defRPr sz="1200" kern="1200">
+        <a:solidFill>
+          <a:schemeClr val="tx1"/>
+        </a:solidFill>
+        <a:latin typeface="+mn-lt"/>
+        <a:ea typeface="+mn-ea"/>
+        <a:cs typeface="+mn-cs"/>
+      </a:defRPr>
+    </a:lvl7pPr>
+    <a:lvl8pPr marL="3200400" algn="l" defTabSz="914400" rtl="0" eaLnBrk="1" latinLnBrk="0" hangingPunct="1">
+      <a:defRPr sz="1200" kern="1200">
+        <a:solidFill>
+          <a:schemeClr val="tx1"/>
+        </a:solidFill>
+        <a:latin typeface="+mn-lt"/>
+        <a:ea typeface="+mn-ea"/>
+        <a:cs typeface="+mn-cs"/>
+      </a:defRPr>
+    </a:lvl8pPr>
+    <a:lvl9pPr marL="3657600" algn="l" defTabSz="914400" rtl="0" eaLnBrk="1" latinLnBrk="0" hangingPunct="1">
+      <a:defRPr sz="1200" kern="1200">
+        <a:solidFill>
+          <a:schemeClr val="tx1"/>
+        </a:solidFill>
+        <a:latin typeface="+mn-lt"/>
+        <a:ea typeface="+mn-ea"/>
+        <a:cs typeface="+mn-cs"/>
+      </a:defRPr>
+    </a:lvl9pPr>
+  </p:notesStyle>
+</p:notesMaster>
+</file>
+
+<file path=ppt/notesSlides/notesSlide1.xml><?xml version="1.0" encoding="utf-8"?>
+<p:notes xmlns:a="http://schemas.openxmlformats.org/drawingml/2006/main" xmlns:r="http://schemas.openxmlformats.org/officeDocument/2006/relationships" xmlns:p="http://schemas.openxmlformats.org/presentationml/2006/main">
+  <p:cSld>
+    <p:spTree>
+      <p:nvGrpSpPr>
+        <p:cNvPr id="1" name=""/>
+        <p:cNvGrpSpPr/>
+        <p:nvPr/>
+      </p:nvGrpSpPr>
+      <p:grpSpPr>
+        <a:xfrm>
+          <a:off x="0" y="0"/>
+          <a:ext cx="0" cy="0"/>
+          <a:chOff x="0" y="0"/>
+          <a:chExt cx="0" cy="0"/>
+        </a:xfrm>
+      </p:grpSpPr>
+      <p:sp>
+        <p:nvSpPr>
+          <p:cNvPr id="2" name="Symbol zastępczy obrazu slajdu 1"/>
+          <p:cNvSpPr>
+            <a:spLocks noGrp="1" noRot="1" noChangeAspect="1"/>
+          </p:cNvSpPr>
+          <p:nvPr>
+            <p:ph type="sldImg"/>
+          </p:nvPr>
+        </p:nvSpPr>
+        <p:spPr/>
+      </p:sp>
+      <p:sp>
+        <p:nvSpPr>
+          <p:cNvPr id="3" name="Symbol zastępczy notatek 2"/>
+          <p:cNvSpPr>
+            <a:spLocks noGrp="1"/>
+          </p:cNvSpPr>
+          <p:nvPr>
+            <p:ph type="body" idx="1"/>
+          </p:nvPr>
+        </p:nvSpPr>
+        <p:spPr/>
+        <p:txBody>
+          <a:bodyPr/>
+          <a:lstStyle/>
+          <a:p>
+            <a:r>
+              <a:rPr lang="pl-PL" dirty="0"/>
+              <a:t>Na podstawie danych o kupowanych samochodach na aukcjach w stanach zjednoczonych należy przewidzieć czy dany samochód będzie dobrym zakupem.</a:t>
+            </a:r>
+          </a:p>
+        </p:txBody>
+      </p:sp>
+      <p:sp>
+        <p:nvSpPr>
+          <p:cNvPr id="4" name="Symbol zastępczy numeru slajdu 3"/>
+          <p:cNvSpPr>
+            <a:spLocks noGrp="1"/>
+          </p:cNvSpPr>
+          <p:nvPr>
+            <p:ph type="sldNum" sz="quarter" idx="5"/>
+          </p:nvPr>
+        </p:nvSpPr>
+        <p:spPr/>
+        <p:txBody>
+          <a:bodyPr/>
+          <a:lstStyle/>
+          <a:p>
+            <a:fld id="{13251115-DB67-4158-A929-62B97692118A}" type="slidenum">
+              <a:rPr lang="pl-PL" smtClean="0"/>
+              <a:t>2</a:t>
+            </a:fld>
+            <a:endParaRPr lang="pl-PL"/>
+          </a:p>
+        </p:txBody>
+      </p:sp>
+    </p:spTree>
+    <p:extLst>
+      <p:ext uri="{BB962C8B-B14F-4D97-AF65-F5344CB8AC3E}">
+        <p14:creationId xmlns:p14="http://schemas.microsoft.com/office/powerpoint/2010/main" val="1890720072"/>
+      </p:ext>
+    </p:extLst>
+  </p:cSld>
+  <p:clrMapOvr>
+    <a:masterClrMapping/>
+  </p:clrMapOvr>
+</p:notes>
+</file>
+
+<file path=ppt/notesSlides/notesSlide2.xml><?xml version="1.0" encoding="utf-8"?>
+<p:notes xmlns:a="http://schemas.openxmlformats.org/drawingml/2006/main" xmlns:r="http://schemas.openxmlformats.org/officeDocument/2006/relationships" xmlns:p="http://schemas.openxmlformats.org/presentationml/2006/main">
+  <p:cSld>
+    <p:spTree>
+      <p:nvGrpSpPr>
+        <p:cNvPr id="1" name=""/>
+        <p:cNvGrpSpPr/>
+        <p:nvPr/>
+      </p:nvGrpSpPr>
+      <p:grpSpPr>
+        <a:xfrm>
+          <a:off x="0" y="0"/>
+          <a:ext cx="0" cy="0"/>
+          <a:chOff x="0" y="0"/>
+          <a:chExt cx="0" cy="0"/>
+        </a:xfrm>
+      </p:grpSpPr>
+      <p:sp>
+        <p:nvSpPr>
+          <p:cNvPr id="2" name="Symbol zastępczy obrazu slajdu 1"/>
+          <p:cNvSpPr>
+            <a:spLocks noGrp="1" noRot="1" noChangeAspect="1"/>
+          </p:cNvSpPr>
+          <p:nvPr>
+            <p:ph type="sldImg"/>
+          </p:nvPr>
+        </p:nvSpPr>
+        <p:spPr/>
+      </p:sp>
+      <p:sp>
+        <p:nvSpPr>
+          <p:cNvPr id="3" name="Symbol zastępczy notatek 2"/>
+          <p:cNvSpPr>
+            <a:spLocks noGrp="1"/>
+          </p:cNvSpPr>
+          <p:nvPr>
+            <p:ph type="body" idx="1"/>
+          </p:nvPr>
+        </p:nvSpPr>
+        <p:spPr/>
+        <p:txBody>
+          <a:bodyPr/>
+          <a:lstStyle/>
+          <a:p>
+            <a:endParaRPr lang="pl-PL" dirty="0"/>
+          </a:p>
+        </p:txBody>
+      </p:sp>
+      <p:sp>
+        <p:nvSpPr>
+          <p:cNvPr id="4" name="Symbol zastępczy numeru slajdu 3"/>
+          <p:cNvSpPr>
+            <a:spLocks noGrp="1"/>
+          </p:cNvSpPr>
+          <p:nvPr>
+            <p:ph type="sldNum" sz="quarter" idx="5"/>
+          </p:nvPr>
+        </p:nvSpPr>
+        <p:spPr/>
+        <p:txBody>
+          <a:bodyPr/>
+          <a:lstStyle/>
+          <a:p>
+            <a:fld id="{13251115-DB67-4158-A929-62B97692118A}" type="slidenum">
+              <a:rPr lang="pl-PL" smtClean="0"/>
+              <a:t>4</a:t>
+            </a:fld>
+            <a:endParaRPr lang="pl-PL"/>
+          </a:p>
+        </p:txBody>
+      </p:sp>
+    </p:spTree>
+    <p:extLst>
+      <p:ext uri="{BB962C8B-B14F-4D97-AF65-F5344CB8AC3E}">
+        <p14:creationId xmlns:p14="http://schemas.microsoft.com/office/powerpoint/2010/main" val="3312218882"/>
+      </p:ext>
+    </p:extLst>
+  </p:cSld>
+  <p:clrMapOvr>
+    <a:masterClrMapping/>
+  </p:clrMapOvr>
+</p:notes>
+</file>
+
+<file path=ppt/notesSlides/notesSlide3.xml><?xml version="1.0" encoding="utf-8"?>
+<p:notes xmlns:a="http://schemas.openxmlformats.org/drawingml/2006/main" xmlns:r="http://schemas.openxmlformats.org/officeDocument/2006/relationships" xmlns:p="http://schemas.openxmlformats.org/presentationml/2006/main">
+  <p:cSld>
+    <p:spTree>
+      <p:nvGrpSpPr>
+        <p:cNvPr id="1" name=""/>
+        <p:cNvGrpSpPr/>
+        <p:nvPr/>
+      </p:nvGrpSpPr>
+      <p:grpSpPr>
+        <a:xfrm>
+          <a:off x="0" y="0"/>
+          <a:ext cx="0" cy="0"/>
+          <a:chOff x="0" y="0"/>
+          <a:chExt cx="0" cy="0"/>
+        </a:xfrm>
+      </p:grpSpPr>
+      <p:sp>
+        <p:nvSpPr>
+          <p:cNvPr id="2" name="Symbol zastępczy obrazu slajdu 1"/>
+          <p:cNvSpPr>
+            <a:spLocks noGrp="1" noRot="1" noChangeAspect="1"/>
+          </p:cNvSpPr>
+          <p:nvPr>
+            <p:ph type="sldImg"/>
+          </p:nvPr>
+        </p:nvSpPr>
+        <p:spPr/>
+      </p:sp>
+      <p:sp>
+        <p:nvSpPr>
+          <p:cNvPr id="3" name="Symbol zastępczy notatek 2"/>
+          <p:cNvSpPr>
+            <a:spLocks noGrp="1"/>
+          </p:cNvSpPr>
+          <p:nvPr>
+            <p:ph type="body" idx="1"/>
+          </p:nvPr>
+        </p:nvSpPr>
+        <p:spPr/>
+        <p:txBody>
+          <a:bodyPr/>
+          <a:lstStyle/>
+          <a:p>
+            <a:r>
+              <a:rPr lang="pl-PL" dirty="0"/>
+              <a:t>Wśród trenowanych modeli znalazły się te powyżej</a:t>
+            </a:r>
+          </a:p>
+          <a:p>
+            <a:endParaRPr lang="pl-PL" dirty="0"/>
+          </a:p>
+          <a:p>
+            <a:endParaRPr lang="pl-PL" dirty="0"/>
+          </a:p>
+        </p:txBody>
+      </p:sp>
+      <p:sp>
+        <p:nvSpPr>
+          <p:cNvPr id="4" name="Symbol zastępczy numeru slajdu 3"/>
+          <p:cNvSpPr>
+            <a:spLocks noGrp="1"/>
+          </p:cNvSpPr>
+          <p:nvPr>
+            <p:ph type="sldNum" sz="quarter" idx="5"/>
+          </p:nvPr>
+        </p:nvSpPr>
+        <p:spPr/>
+        <p:txBody>
+          <a:bodyPr/>
+          <a:lstStyle/>
+          <a:p>
+            <a:fld id="{C12F697F-AD73-4570-9A8C-8DD8E066A536}" type="slidenum">
+              <a:rPr lang="pl-PL" smtClean="0"/>
+              <a:t>5</a:t>
+            </a:fld>
+            <a:endParaRPr lang="pl-PL"/>
+          </a:p>
+        </p:txBody>
+      </p:sp>
+    </p:spTree>
+    <p:extLst>
+      <p:ext uri="{BB962C8B-B14F-4D97-AF65-F5344CB8AC3E}">
+        <p14:creationId xmlns:p14="http://schemas.microsoft.com/office/powerpoint/2010/main" val="1862778641"/>
+      </p:ext>
+    </p:extLst>
+  </p:cSld>
+  <p:clrMapOvr>
+    <a:masterClrMapping/>
+  </p:clrMapOvr>
+</p:notes>
+</file>
+
+<file path=ppt/notesSlides/notesSlide4.xml><?xml version="1.0" encoding="utf-8"?>
+<p:notes xmlns:a="http://schemas.openxmlformats.org/drawingml/2006/main" xmlns:r="http://schemas.openxmlformats.org/officeDocument/2006/relationships" xmlns:p="http://schemas.openxmlformats.org/presentationml/2006/main">
+  <p:cSld>
+    <p:spTree>
+      <p:nvGrpSpPr>
+        <p:cNvPr id="1" name=""/>
+        <p:cNvGrpSpPr/>
+        <p:nvPr/>
+      </p:nvGrpSpPr>
+      <p:grpSpPr>
+        <a:xfrm>
+          <a:off x="0" y="0"/>
+          <a:ext cx="0" cy="0"/>
+          <a:chOff x="0" y="0"/>
+          <a:chExt cx="0" cy="0"/>
+        </a:xfrm>
+      </p:grpSpPr>
+      <p:sp>
+        <p:nvSpPr>
+          <p:cNvPr id="2" name="Symbol zastępczy obrazu slajdu 1"/>
+          <p:cNvSpPr>
+            <a:spLocks noGrp="1" noRot="1" noChangeAspect="1"/>
+          </p:cNvSpPr>
+          <p:nvPr>
+            <p:ph type="sldImg"/>
+          </p:nvPr>
+        </p:nvSpPr>
+        <p:spPr/>
+      </p:sp>
+      <p:sp>
+        <p:nvSpPr>
+          <p:cNvPr id="3" name="Symbol zastępczy notatek 2"/>
+          <p:cNvSpPr>
+            <a:spLocks noGrp="1"/>
+          </p:cNvSpPr>
+          <p:nvPr>
+            <p:ph type="body" idx="1"/>
+          </p:nvPr>
+        </p:nvSpPr>
+        <p:spPr/>
+        <p:txBody>
+          <a:bodyPr/>
+          <a:lstStyle/>
+          <a:p>
+            <a:endParaRPr lang="pl-PL" dirty="0"/>
+          </a:p>
+        </p:txBody>
+      </p:sp>
+      <p:sp>
+        <p:nvSpPr>
+          <p:cNvPr id="4" name="Symbol zastępczy numeru slajdu 3"/>
+          <p:cNvSpPr>
+            <a:spLocks noGrp="1"/>
+          </p:cNvSpPr>
+          <p:nvPr>
+            <p:ph type="sldNum" sz="quarter" idx="5"/>
+          </p:nvPr>
+        </p:nvSpPr>
+        <p:spPr/>
+        <p:txBody>
+          <a:bodyPr/>
+          <a:lstStyle/>
+          <a:p>
+            <a:fld id="{13251115-DB67-4158-A929-62B97692118A}" type="slidenum">
+              <a:rPr lang="pl-PL" smtClean="0"/>
+              <a:t>6</a:t>
+            </a:fld>
+            <a:endParaRPr lang="pl-PL"/>
+          </a:p>
+        </p:txBody>
+      </p:sp>
+    </p:spTree>
+    <p:extLst>
+      <p:ext uri="{BB962C8B-B14F-4D97-AF65-F5344CB8AC3E}">
+        <p14:creationId xmlns:p14="http://schemas.microsoft.com/office/powerpoint/2010/main" val="1833129478"/>
+      </p:ext>
+    </p:extLst>
+  </p:cSld>
+  <p:clrMapOvr>
+    <a:masterClrMapping/>
+  </p:clrMapOvr>
+</p:notes>
+</file>
+
+<file path=ppt/notesSlides/notesSlide5.xml><?xml version="1.0" encoding="utf-8"?>
+<p:notes xmlns:a="http://schemas.openxmlformats.org/drawingml/2006/main" xmlns:r="http://schemas.openxmlformats.org/officeDocument/2006/relationships" xmlns:p="http://schemas.openxmlformats.org/presentationml/2006/main">
+  <p:cSld>
+    <p:spTree>
+      <p:nvGrpSpPr>
+        <p:cNvPr id="1" name=""/>
+        <p:cNvGrpSpPr/>
+        <p:nvPr/>
+      </p:nvGrpSpPr>
+      <p:grpSpPr>
+        <a:xfrm>
+          <a:off x="0" y="0"/>
+          <a:ext cx="0" cy="0"/>
+          <a:chOff x="0" y="0"/>
+          <a:chExt cx="0" cy="0"/>
+        </a:xfrm>
+      </p:grpSpPr>
+      <p:sp>
+        <p:nvSpPr>
+          <p:cNvPr id="2" name="Symbol zastępczy obrazu slajdu 1"/>
+          <p:cNvSpPr>
+            <a:spLocks noGrp="1" noRot="1" noChangeAspect="1"/>
+          </p:cNvSpPr>
+          <p:nvPr>
+            <p:ph type="sldImg"/>
+          </p:nvPr>
+        </p:nvSpPr>
+        <p:spPr/>
+      </p:sp>
+      <p:sp>
+        <p:nvSpPr>
+          <p:cNvPr id="3" name="Symbol zastępczy notatek 2"/>
+          <p:cNvSpPr>
+            <a:spLocks noGrp="1"/>
+          </p:cNvSpPr>
+          <p:nvPr>
+            <p:ph type="body" idx="1"/>
+          </p:nvPr>
+        </p:nvSpPr>
+        <p:spPr/>
+        <p:txBody>
+          <a:bodyPr/>
+          <a:lstStyle/>
+          <a:p>
+            <a:endParaRPr lang="pl-PL" dirty="0"/>
+          </a:p>
+        </p:txBody>
+      </p:sp>
+      <p:sp>
+        <p:nvSpPr>
+          <p:cNvPr id="4" name="Symbol zastępczy numeru slajdu 3"/>
+          <p:cNvSpPr>
+            <a:spLocks noGrp="1"/>
+          </p:cNvSpPr>
+          <p:nvPr>
+            <p:ph type="sldNum" sz="quarter" idx="5"/>
+          </p:nvPr>
+        </p:nvSpPr>
+        <p:spPr/>
+        <p:txBody>
+          <a:bodyPr/>
+          <a:lstStyle/>
+          <a:p>
+            <a:fld id="{13251115-DB67-4158-A929-62B97692118A}" type="slidenum">
+              <a:rPr lang="pl-PL" smtClean="0"/>
+              <a:t>10</a:t>
+            </a:fld>
+            <a:endParaRPr lang="pl-PL"/>
+          </a:p>
+        </p:txBody>
+      </p:sp>
+    </p:spTree>
+    <p:extLst>
+      <p:ext uri="{BB962C8B-B14F-4D97-AF65-F5344CB8AC3E}">
+        <p14:creationId xmlns:p14="http://schemas.microsoft.com/office/powerpoint/2010/main" val="837585432"/>
+      </p:ext>
+    </p:extLst>
+  </p:cSld>
+  <p:clrMapOvr>
+    <a:masterClrMapping/>
+  </p:clrMapOvr>
+</p:notes>
+</file>
+
+<file path=ppt/notesSlides/notesSlide6.xml><?xml version="1.0" encoding="utf-8"?>
+<p:notes xmlns:a="http://schemas.openxmlformats.org/drawingml/2006/main" xmlns:r="http://schemas.openxmlformats.org/officeDocument/2006/relationships" xmlns:p="http://schemas.openxmlformats.org/presentationml/2006/main">
+  <p:cSld>
+    <p:spTree>
+      <p:nvGrpSpPr>
+        <p:cNvPr id="1" name=""/>
+        <p:cNvGrpSpPr/>
+        <p:nvPr/>
+      </p:nvGrpSpPr>
+      <p:grpSpPr>
+        <a:xfrm>
+          <a:off x="0" y="0"/>
+          <a:ext cx="0" cy="0"/>
+          <a:chOff x="0" y="0"/>
+          <a:chExt cx="0" cy="0"/>
+        </a:xfrm>
+      </p:grpSpPr>
+      <p:sp>
+        <p:nvSpPr>
+          <p:cNvPr id="2" name="Symbol zastępczy obrazu slajdu 1"/>
+          <p:cNvSpPr>
+            <a:spLocks noGrp="1" noRot="1" noChangeAspect="1"/>
+          </p:cNvSpPr>
+          <p:nvPr>
+            <p:ph type="sldImg"/>
+          </p:nvPr>
+        </p:nvSpPr>
+        <p:spPr/>
+      </p:sp>
+      <p:sp>
+        <p:nvSpPr>
+          <p:cNvPr id="3" name="Symbol zastępczy notatek 2"/>
+          <p:cNvSpPr>
+            <a:spLocks noGrp="1"/>
+          </p:cNvSpPr>
+          <p:nvPr>
+            <p:ph type="body" idx="1"/>
+          </p:nvPr>
+        </p:nvSpPr>
+        <p:spPr/>
+        <p:txBody>
+          <a:bodyPr/>
+          <a:lstStyle/>
+          <a:p>
+            <a:endParaRPr lang="pl-PL" dirty="0"/>
+          </a:p>
+        </p:txBody>
+      </p:sp>
+      <p:sp>
+        <p:nvSpPr>
+          <p:cNvPr id="4" name="Symbol zastępczy numeru slajdu 3"/>
+          <p:cNvSpPr>
+            <a:spLocks noGrp="1"/>
+          </p:cNvSpPr>
+          <p:nvPr>
+            <p:ph type="sldNum" sz="quarter" idx="5"/>
+          </p:nvPr>
+        </p:nvSpPr>
+        <p:spPr/>
+        <p:txBody>
+          <a:bodyPr/>
+          <a:lstStyle/>
+          <a:p>
+            <a:fld id="{13251115-DB67-4158-A929-62B97692118A}" type="slidenum">
+              <a:rPr lang="pl-PL" smtClean="0"/>
+              <a:t>11</a:t>
+            </a:fld>
+            <a:endParaRPr lang="pl-PL"/>
+          </a:p>
+        </p:txBody>
+      </p:sp>
+    </p:spTree>
+    <p:extLst>
+      <p:ext uri="{BB962C8B-B14F-4D97-AF65-F5344CB8AC3E}">
+        <p14:creationId xmlns:p14="http://schemas.microsoft.com/office/powerpoint/2010/main" val="1586593121"/>
+      </p:ext>
+    </p:extLst>
+  </p:cSld>
+  <p:clrMapOvr>
+    <a:masterClrMapping/>
+  </p:clrMapOvr>
+</p:notes>
 </file>
 
 <file path=ppt/slideLayouts/slideLayout1.xml><?xml version="1.0" encoding="utf-8"?>
@@ -5951,6 +6821,368 @@
           <a:chExt cx="0" cy="0"/>
         </a:xfrm>
       </p:grpSpPr>
+      <p:pic>
+        <p:nvPicPr>
+          <p:cNvPr id="5" name="Obraz 4">
+            <a:extLst>
+              <a:ext uri="{FF2B5EF4-FFF2-40B4-BE49-F238E27FC236}">
+                <a16:creationId xmlns:a16="http://schemas.microsoft.com/office/drawing/2014/main" id="{74244A0C-DF94-FE58-8B30-536C1DFFD7A4}"/>
+              </a:ext>
+            </a:extLst>
+          </p:cNvPr>
+          <p:cNvPicPr>
+            <a:picLocks noChangeAspect="1"/>
+          </p:cNvPicPr>
+          <p:nvPr/>
+        </p:nvPicPr>
+        <p:blipFill>
+          <a:blip r:embed="rId3"/>
+          <a:stretch>
+            <a:fillRect/>
+          </a:stretch>
+        </p:blipFill>
+        <p:spPr>
+          <a:xfrm>
+            <a:off x="7384513" y="3429000"/>
+            <a:ext cx="4410323" cy="3415173"/>
+          </a:xfrm>
+          <a:prstGeom prst="rect">
+            <a:avLst/>
+          </a:prstGeom>
+        </p:spPr>
+      </p:pic>
+      <p:sp>
+        <p:nvSpPr>
+          <p:cNvPr id="2" name="Tytuł 1">
+            <a:extLst>
+              <a:ext uri="{FF2B5EF4-FFF2-40B4-BE49-F238E27FC236}">
+                <a16:creationId xmlns:a16="http://schemas.microsoft.com/office/drawing/2014/main" id="{388B84C6-136A-FDF1-ED6E-E6D0A56F28A0}"/>
+              </a:ext>
+            </a:extLst>
+          </p:cNvPr>
+          <p:cNvSpPr>
+            <a:spLocks noGrp="1"/>
+          </p:cNvSpPr>
+          <p:nvPr>
+            <p:ph type="title"/>
+          </p:nvPr>
+        </p:nvSpPr>
+        <p:spPr/>
+        <p:txBody>
+          <a:bodyPr/>
+          <a:lstStyle/>
+          <a:p>
+            <a:r>
+              <a:rPr lang="pl-PL" dirty="0"/>
+              <a:t>Redukcja wymiarów</a:t>
+            </a:r>
+          </a:p>
+        </p:txBody>
+      </p:sp>
+      <p:sp>
+        <p:nvSpPr>
+          <p:cNvPr id="3" name="Symbol zastępczy zawartości 2">
+            <a:extLst>
+              <a:ext uri="{FF2B5EF4-FFF2-40B4-BE49-F238E27FC236}">
+                <a16:creationId xmlns:a16="http://schemas.microsoft.com/office/drawing/2014/main" id="{FB392D7F-5C03-2C1E-04EA-B5BA997CC568}"/>
+              </a:ext>
+            </a:extLst>
+          </p:cNvPr>
+          <p:cNvSpPr>
+            <a:spLocks noGrp="1"/>
+          </p:cNvSpPr>
+          <p:nvPr>
+            <p:ph idx="1"/>
+          </p:nvPr>
+        </p:nvSpPr>
+        <p:spPr>
+          <a:xfrm>
+            <a:off x="838200" y="1825625"/>
+            <a:ext cx="7523922" cy="4351338"/>
+          </a:xfrm>
+        </p:spPr>
+        <p:txBody>
+          <a:bodyPr/>
+          <a:lstStyle/>
+          <a:p>
+            <a:r>
+              <a:rPr lang="pl-PL" dirty="0"/>
+              <a:t>Otrzymana ostatecznie ramka danych w </a:t>
+            </a:r>
+            <a:r>
+              <a:rPr lang="pl-PL" dirty="0" err="1"/>
+              <a:t>preprocessingu</a:t>
+            </a:r>
+            <a:r>
+              <a:rPr lang="pl-PL" dirty="0"/>
+              <a:t> miała 105 kolumn</a:t>
+            </a:r>
+          </a:p>
+          <a:p>
+            <a:r>
+              <a:rPr lang="pl-PL" dirty="0"/>
+              <a:t>Niektóre modele, typu KNN lub SVM są wrażliwe na duża liczbę wymiarów</a:t>
+            </a:r>
+          </a:p>
+          <a:p>
+            <a:r>
+              <a:rPr lang="pl-PL" dirty="0"/>
+              <a:t>Za pomocą PCA próbowaliśmy zredukować liczbę wymiarów</a:t>
+            </a:r>
+          </a:p>
+          <a:p>
+            <a:r>
+              <a:rPr lang="pl-PL" dirty="0"/>
+              <a:t>Nie przyniosło to zbyt dobrych rezultatów</a:t>
+            </a:r>
+          </a:p>
+          <a:p>
+            <a:r>
+              <a:rPr lang="pl-PL" dirty="0"/>
+              <a:t>Straciliśmy </a:t>
+            </a:r>
+            <a:r>
+              <a:rPr lang="pl-PL" dirty="0" err="1"/>
+              <a:t>wyjaśnialność</a:t>
+            </a:r>
+            <a:r>
+              <a:rPr lang="pl-PL" dirty="0"/>
+              <a:t> modeli</a:t>
+            </a:r>
+          </a:p>
+          <a:p>
+            <a:endParaRPr lang="pl-PL" dirty="0"/>
+          </a:p>
+          <a:p>
+            <a:endParaRPr lang="pl-PL" dirty="0"/>
+          </a:p>
+        </p:txBody>
+      </p:sp>
+    </p:spTree>
+    <p:extLst>
+      <p:ext uri="{BB962C8B-B14F-4D97-AF65-F5344CB8AC3E}">
+        <p14:creationId xmlns:p14="http://schemas.microsoft.com/office/powerpoint/2010/main" val="3485901157"/>
+      </p:ext>
+    </p:extLst>
+  </p:cSld>
+  <p:clrMapOvr>
+    <a:masterClrMapping/>
+  </p:clrMapOvr>
+</p:sld>
+</file>
+
+<file path=ppt/slides/slide11.xml><?xml version="1.0" encoding="utf-8"?>
+<p:sld xmlns:a="http://schemas.openxmlformats.org/drawingml/2006/main" xmlns:r="http://schemas.openxmlformats.org/officeDocument/2006/relationships" xmlns:p="http://schemas.openxmlformats.org/presentationml/2006/main">
+  <p:cSld>
+    <p:spTree>
+      <p:nvGrpSpPr>
+        <p:cNvPr id="1" name=""/>
+        <p:cNvGrpSpPr/>
+        <p:nvPr/>
+      </p:nvGrpSpPr>
+      <p:grpSpPr>
+        <a:xfrm>
+          <a:off x="0" y="0"/>
+          <a:ext cx="0" cy="0"/>
+          <a:chOff x="0" y="0"/>
+          <a:chExt cx="0" cy="0"/>
+        </a:xfrm>
+      </p:grpSpPr>
+      <p:sp>
+        <p:nvSpPr>
+          <p:cNvPr id="2" name="Tytuł 1">
+            <a:extLst>
+              <a:ext uri="{FF2B5EF4-FFF2-40B4-BE49-F238E27FC236}">
+                <a16:creationId xmlns:a16="http://schemas.microsoft.com/office/drawing/2014/main" id="{CB5CE4FD-D850-2023-E958-485B7164E763}"/>
+              </a:ext>
+            </a:extLst>
+          </p:cNvPr>
+          <p:cNvSpPr>
+            <a:spLocks noGrp="1"/>
+          </p:cNvSpPr>
+          <p:nvPr>
+            <p:ph type="title"/>
+          </p:nvPr>
+        </p:nvSpPr>
+        <p:spPr/>
+        <p:txBody>
+          <a:bodyPr/>
+          <a:lstStyle/>
+          <a:p>
+            <a:r>
+              <a:rPr lang="pl-PL" dirty="0" err="1"/>
+              <a:t>Sampling</a:t>
+            </a:r>
+            <a:r>
+              <a:rPr lang="pl-PL" dirty="0"/>
+              <a:t> danych</a:t>
+            </a:r>
+          </a:p>
+        </p:txBody>
+      </p:sp>
+      <p:sp>
+        <p:nvSpPr>
+          <p:cNvPr id="3" name="Symbol zastępczy zawartości 2">
+            <a:extLst>
+              <a:ext uri="{FF2B5EF4-FFF2-40B4-BE49-F238E27FC236}">
+                <a16:creationId xmlns:a16="http://schemas.microsoft.com/office/drawing/2014/main" id="{D3DAB445-79F0-4A68-CD10-00871B8B119A}"/>
+              </a:ext>
+            </a:extLst>
+          </p:cNvPr>
+          <p:cNvSpPr>
+            <a:spLocks noGrp="1"/>
+          </p:cNvSpPr>
+          <p:nvPr>
+            <p:ph idx="1"/>
+          </p:nvPr>
+        </p:nvSpPr>
+        <p:spPr/>
+        <p:txBody>
+          <a:bodyPr/>
+          <a:lstStyle/>
+          <a:p>
+            <a:r>
+              <a:rPr lang="pl-PL" dirty="0" err="1"/>
+              <a:t>Oversampling</a:t>
+            </a:r>
+            <a:r>
+              <a:rPr lang="pl-PL" dirty="0"/>
+              <a:t> i </a:t>
+            </a:r>
+            <a:r>
+              <a:rPr lang="pl-PL" dirty="0" err="1"/>
+              <a:t>oversampling</a:t>
+            </a:r>
+            <a:endParaRPr lang="pl-PL" dirty="0"/>
+          </a:p>
+          <a:p>
+            <a:r>
+              <a:rPr lang="pl-PL" dirty="0"/>
+              <a:t>W przypadku </a:t>
+            </a:r>
+            <a:r>
+              <a:rPr lang="pl-PL" dirty="0" err="1"/>
+              <a:t>XGBoost</a:t>
+            </a:r>
+            <a:r>
+              <a:rPr lang="pl-PL" dirty="0"/>
+              <a:t> nie przyniosły oczekiwanych rezultatów</a:t>
+            </a:r>
+          </a:p>
+          <a:p>
+            <a:r>
+              <a:rPr lang="pl-PL" dirty="0"/>
+              <a:t>SMOTE dla </a:t>
+            </a:r>
+            <a:r>
+              <a:rPr lang="pl-PL" dirty="0" err="1"/>
+              <a:t>Random</a:t>
+            </a:r>
+            <a:r>
+              <a:rPr lang="pl-PL" dirty="0"/>
+              <a:t> </a:t>
+            </a:r>
+            <a:r>
+              <a:rPr lang="pl-PL" dirty="0" err="1"/>
+              <a:t>Foresta</a:t>
+            </a:r>
+            <a:r>
+              <a:rPr lang="pl-PL" dirty="0"/>
+              <a:t> dał najlepszy wynik AUC</a:t>
+            </a:r>
+          </a:p>
+          <a:p>
+            <a:r>
+              <a:rPr lang="pl-PL" dirty="0"/>
+              <a:t>Model </a:t>
+            </a:r>
+            <a:r>
+              <a:rPr lang="pl-PL" dirty="0" err="1"/>
+              <a:t>Random</a:t>
+            </a:r>
+            <a:r>
+              <a:rPr lang="pl-PL" dirty="0"/>
+              <a:t> </a:t>
+            </a:r>
+            <a:r>
+              <a:rPr lang="pl-PL" dirty="0" err="1"/>
+              <a:t>Forest</a:t>
+            </a:r>
+            <a:r>
+              <a:rPr lang="pl-PL" dirty="0"/>
+              <a:t> na SMOTE danych był najlepszy na testach </a:t>
+            </a:r>
+            <a:r>
+              <a:rPr lang="pl-PL" dirty="0" err="1"/>
+              <a:t>kaggla</a:t>
+            </a:r>
+            <a:endParaRPr lang="pl-PL" dirty="0"/>
+          </a:p>
+          <a:p>
+            <a:endParaRPr lang="pl-PL" dirty="0"/>
+          </a:p>
+        </p:txBody>
+      </p:sp>
+      <p:pic>
+        <p:nvPicPr>
+          <p:cNvPr id="6" name="Obraz 5">
+            <a:extLst>
+              <a:ext uri="{FF2B5EF4-FFF2-40B4-BE49-F238E27FC236}">
+                <a16:creationId xmlns:a16="http://schemas.microsoft.com/office/drawing/2014/main" id="{5EFF89CE-34E2-094E-F13C-F104F8BC45D8}"/>
+              </a:ext>
+            </a:extLst>
+          </p:cNvPr>
+          <p:cNvPicPr>
+            <a:picLocks noChangeAspect="1"/>
+          </p:cNvPicPr>
+          <p:nvPr/>
+        </p:nvPicPr>
+        <p:blipFill>
+          <a:blip r:embed="rId3"/>
+          <a:stretch>
+            <a:fillRect/>
+          </a:stretch>
+        </p:blipFill>
+        <p:spPr>
+          <a:xfrm>
+            <a:off x="7935686" y="308882"/>
+            <a:ext cx="3647394" cy="3023413"/>
+          </a:xfrm>
+          <a:prstGeom prst="rect">
+            <a:avLst/>
+          </a:prstGeom>
+        </p:spPr>
+      </p:pic>
+    </p:spTree>
+    <p:extLst>
+      <p:ext uri="{BB962C8B-B14F-4D97-AF65-F5344CB8AC3E}">
+        <p14:creationId xmlns:p14="http://schemas.microsoft.com/office/powerpoint/2010/main" val="3372932893"/>
+      </p:ext>
+    </p:extLst>
+  </p:cSld>
+  <p:clrMapOvr>
+    <a:masterClrMapping/>
+  </p:clrMapOvr>
+</p:sld>
+</file>
+
+<file path=ppt/slides/slide12.xml><?xml version="1.0" encoding="utf-8"?>
+<p:sld xmlns:a="http://schemas.openxmlformats.org/drawingml/2006/main" xmlns:r="http://schemas.openxmlformats.org/officeDocument/2006/relationships" xmlns:p="http://schemas.openxmlformats.org/presentationml/2006/main">
+  <p:cSld>
+    <p:spTree>
+      <p:nvGrpSpPr>
+        <p:cNvPr id="1" name=""/>
+        <p:cNvGrpSpPr/>
+        <p:nvPr/>
+      </p:nvGrpSpPr>
+      <p:grpSpPr>
+        <a:xfrm>
+          <a:off x="0" y="0"/>
+          <a:ext cx="0" cy="0"/>
+          <a:chOff x="0" y="0"/>
+          <a:chExt cx="0" cy="0"/>
+        </a:xfrm>
+      </p:grpSpPr>
       <p:sp>
         <p:nvSpPr>
           <p:cNvPr id="2" name="Tytuł 1">
@@ -5973,10 +7205,9 @@
           <a:lstStyle/>
           <a:p>
             <a:r>
-              <a:rPr lang="pl-PL" dirty="0" err="1"/>
-              <a:t>Summary</a:t>
-            </a:r>
-            <a:endParaRPr lang="pl-PL" dirty="0"/>
+              <a:rPr lang="pl-PL" dirty="0"/>
+              <a:t>Podsumowanie</a:t>
+            </a:r>
           </a:p>
         </p:txBody>
       </p:sp>
@@ -6073,16 +7304,8 @@
           <a:lstStyle/>
           <a:p>
             <a:r>
-              <a:rPr lang="en-US" sz="5200" dirty="0"/>
-              <a:t>Problem description</a:t>
-            </a:r>
-            <a:r>
               <a:rPr lang="pl-PL" sz="5200" dirty="0"/>
-              <a:t> – biznesowy </a:t>
-            </a:r>
-            <a:r>
-              <a:rPr lang="pl-PL" sz="5200"/>
-              <a:t>opis problemu</a:t>
+              <a:t>biznesowy opis problemu</a:t>
             </a:r>
             <a:endParaRPr lang="en-US" sz="5200" dirty="0"/>
           </a:p>
@@ -6142,7 +7365,7 @@
           <p:nvPr/>
         </p:nvPicPr>
         <p:blipFill rotWithShape="1">
-          <a:blip r:embed="rId2"/>
+          <a:blip r:embed="rId3"/>
           <a:srcRect l="29065" r="22337" b="-1"/>
           <a:stretch/>
         </p:blipFill>
@@ -6235,10 +7458,59 @@
           <a:bodyPr/>
           <a:lstStyle/>
           <a:p>
-            <a:endParaRPr lang="pl-PL"/>
-          </a:p>
-        </p:txBody>
-      </p:sp>
+            <a:r>
+              <a:rPr lang="pl-PL" dirty="0"/>
+              <a:t>Analizowane dane pochodziły z aukcji w USA w latach 2006-2007</a:t>
+            </a:r>
+          </a:p>
+          <a:p>
+            <a:r>
+              <a:rPr lang="pl-PL" b="1" dirty="0"/>
+              <a:t>Niezbalansowane</a:t>
+            </a:r>
+            <a:r>
+              <a:rPr lang="pl-PL" dirty="0"/>
+              <a:t> dane</a:t>
+            </a:r>
+          </a:p>
+          <a:p>
+            <a:r>
+              <a:rPr lang="pl-PL" dirty="0"/>
+              <a:t>Niewiele braków danych</a:t>
+            </a:r>
+          </a:p>
+        </p:txBody>
+      </p:sp>
+      <p:pic>
+        <p:nvPicPr>
+          <p:cNvPr id="4" name="Obraz 3">
+            <a:extLst>
+              <a:ext uri="{FF2B5EF4-FFF2-40B4-BE49-F238E27FC236}">
+                <a16:creationId xmlns:a16="http://schemas.microsoft.com/office/drawing/2014/main" id="{434178BA-2552-E732-99F2-8BCAB680F26B}"/>
+              </a:ext>
+            </a:extLst>
+          </p:cNvPr>
+          <p:cNvPicPr>
+            <a:picLocks noChangeAspect="1"/>
+          </p:cNvPicPr>
+          <p:nvPr/>
+        </p:nvPicPr>
+        <p:blipFill>
+          <a:blip r:embed="rId2"/>
+          <a:stretch>
+            <a:fillRect/>
+          </a:stretch>
+        </p:blipFill>
+        <p:spPr>
+          <a:xfrm>
+            <a:off x="7696594" y="2703914"/>
+            <a:ext cx="4014153" cy="3087286"/>
+          </a:xfrm>
+          <a:prstGeom prst="rect">
+            <a:avLst/>
+          </a:prstGeom>
+        </p:spPr>
+      </p:pic>
     </p:spTree>
     <p:extLst>
       <p:ext uri="{BB962C8B-B14F-4D97-AF65-F5344CB8AC3E}">
@@ -6360,6 +7632,24 @@
               <a:t> – co zrobiliśmy</a:t>
             </a:r>
           </a:p>
+          <a:p>
+            <a:r>
+              <a:rPr lang="pl-PL" dirty="0"/>
+              <a:t>usunięcie nadmiernie skorelowanych kolumn</a:t>
+            </a:r>
+          </a:p>
+          <a:p>
+            <a:endParaRPr lang="pl-PL" dirty="0"/>
+          </a:p>
+          <a:p>
+            <a:r>
+              <a:rPr lang="pl-PL" dirty="0"/>
+              <a:t># za dużo tekstu – wystarczą hasła</a:t>
+            </a:r>
+          </a:p>
+          <a:p>
+            <a:endParaRPr lang="pl-PL" dirty="0"/>
+          </a:p>
         </p:txBody>
       </p:sp>
     </p:spTree>
@@ -6414,19 +7704,18 @@
           <a:lstStyle/>
           <a:p>
             <a:r>
-              <a:rPr lang="pl-PL" dirty="0" err="1"/>
-              <a:t>Modelling</a:t>
-            </a:r>
-            <a:endParaRPr lang="pl-PL" dirty="0"/>
-          </a:p>
-        </p:txBody>
-      </p:sp>
-      <p:sp>
-        <p:nvSpPr>
-          <p:cNvPr id="3" name="Symbol zastępczy zawartości 2">
+              <a:rPr lang="pl-PL" dirty="0"/>
+              <a:t>Trenowanie modeli</a:t>
+            </a:r>
+          </a:p>
+        </p:txBody>
+      </p:sp>
+      <p:sp>
+        <p:nvSpPr>
+          <p:cNvPr id="5" name="Symbol zastępczy zawartości 4">
             <a:extLst>
               <a:ext uri="{FF2B5EF4-FFF2-40B4-BE49-F238E27FC236}">
-                <a16:creationId xmlns:a16="http://schemas.microsoft.com/office/drawing/2014/main" id="{9BD4B4B4-B1AB-9FC4-EA20-53705A02C2DB}"/>
+                <a16:creationId xmlns:a16="http://schemas.microsoft.com/office/drawing/2014/main" id="{DFCC3BB0-64DB-E132-6E14-E23E2A57E666}"/>
               </a:ext>
             </a:extLst>
           </p:cNvPr>
@@ -6442,14 +7731,72 @@
           <a:bodyPr/>
           <a:lstStyle/>
           <a:p>
-            <a:endParaRPr lang="pl-PL"/>
+            <a:pPr marL="0" indent="0">
+              <a:buNone/>
+            </a:pPr>
+            <a:r>
+              <a:rPr lang="pl-PL" dirty="0"/>
+              <a:t>Wykorzystaliśmy wiele typów modeli:</a:t>
+            </a:r>
+          </a:p>
+          <a:p>
+            <a:r>
+              <a:rPr lang="pl-PL" dirty="0"/>
+              <a:t>Regresja logistyczna</a:t>
+            </a:r>
+          </a:p>
+          <a:p>
+            <a:r>
+              <a:rPr lang="pl-PL" dirty="0"/>
+              <a:t>KNN</a:t>
+            </a:r>
+          </a:p>
+          <a:p>
+            <a:r>
+              <a:rPr lang="pl-PL" dirty="0"/>
+              <a:t>Drzewa decyzyjne</a:t>
+            </a:r>
+          </a:p>
+          <a:p>
+            <a:r>
+              <a:rPr lang="pl-PL" dirty="0"/>
+              <a:t>Lasy losowe</a:t>
+            </a:r>
+          </a:p>
+          <a:p>
+            <a:r>
+              <a:rPr lang="pl-PL" dirty="0" err="1"/>
+              <a:t>XGBoost</a:t>
+            </a:r>
+            <a:endParaRPr lang="pl-PL" dirty="0"/>
+          </a:p>
+          <a:p>
+            <a:r>
+              <a:rPr lang="pl-PL" dirty="0"/>
+              <a:t>SVM</a:t>
+            </a:r>
+          </a:p>
+          <a:p>
+            <a:r>
+              <a:rPr lang="pl-PL" dirty="0" err="1"/>
+              <a:t>Voting</a:t>
+            </a:r>
+            <a:r>
+              <a:rPr lang="pl-PL" dirty="0"/>
+              <a:t> </a:t>
+            </a:r>
+            <a:r>
+              <a:rPr lang="pl-PL" dirty="0" err="1"/>
+              <a:t>classifier</a:t>
+            </a:r>
+            <a:endParaRPr lang="pl-PL" dirty="0"/>
           </a:p>
         </p:txBody>
       </p:sp>
     </p:spTree>
     <p:extLst>
       <p:ext uri="{BB962C8B-B14F-4D97-AF65-F5344CB8AC3E}">
-        <p14:creationId xmlns:p14="http://schemas.microsoft.com/office/powerpoint/2010/main" val="1137966016"/>
+        <p14:creationId xmlns:p14="http://schemas.microsoft.com/office/powerpoint/2010/main" val="1756750599"/>
       </p:ext>
     </p:extLst>
   </p:cSld>
@@ -6462,102 +7809,10 @@
 <file path=ppt/slides/slide6.xml><?xml version="1.0" encoding="utf-8"?>
 <p:sld xmlns:a="http://schemas.openxmlformats.org/drawingml/2006/main" xmlns:r="http://schemas.openxmlformats.org/officeDocument/2006/relationships" xmlns:p="http://schemas.openxmlformats.org/presentationml/2006/main">
   <p:cSld>
-    <p:spTree>
-      <p:nvGrpSpPr>
-        <p:cNvPr id="1" name=""/>
-        <p:cNvGrpSpPr/>
-        <p:nvPr/>
-      </p:nvGrpSpPr>
-      <p:grpSpPr>
-        <a:xfrm>
-          <a:off x="0" y="0"/>
-          <a:ext cx="0" cy="0"/>
-          <a:chOff x="0" y="0"/>
-          <a:chExt cx="0" cy="0"/>
-        </a:xfrm>
-      </p:grpSpPr>
-      <p:sp>
-        <p:nvSpPr>
-          <p:cNvPr id="2" name="Tytuł 1">
-            <a:extLst>
-              <a:ext uri="{FF2B5EF4-FFF2-40B4-BE49-F238E27FC236}">
-                <a16:creationId xmlns:a16="http://schemas.microsoft.com/office/drawing/2014/main" id="{9518BA8E-F04C-8CB9-D55A-28FD53536D9E}"/>
-              </a:ext>
-            </a:extLst>
-          </p:cNvPr>
-          <p:cNvSpPr>
-            <a:spLocks noGrp="1"/>
-          </p:cNvSpPr>
-          <p:nvPr>
-            <p:ph type="title"/>
-          </p:nvPr>
-        </p:nvSpPr>
-        <p:spPr/>
-        <p:txBody>
-          <a:bodyPr/>
-          <a:lstStyle/>
-          <a:p>
-            <a:r>
-              <a:rPr lang="pl-PL" dirty="0" err="1"/>
-              <a:t>Random</a:t>
-            </a:r>
-            <a:r>
-              <a:rPr lang="pl-PL" dirty="0"/>
-              <a:t> </a:t>
-            </a:r>
-            <a:r>
-              <a:rPr lang="pl-PL" dirty="0" err="1"/>
-              <a:t>Forest</a:t>
-            </a:r>
-            <a:endParaRPr lang="pl-PL" dirty="0"/>
-          </a:p>
-        </p:txBody>
-      </p:sp>
-      <p:sp>
-        <p:nvSpPr>
-          <p:cNvPr id="3" name="Symbol zastępczy zawartości 2">
-            <a:extLst>
-              <a:ext uri="{FF2B5EF4-FFF2-40B4-BE49-F238E27FC236}">
-                <a16:creationId xmlns:a16="http://schemas.microsoft.com/office/drawing/2014/main" id="{D8A96229-6ECA-6296-EDA7-0AAB2803BF6F}"/>
-              </a:ext>
-            </a:extLst>
-          </p:cNvPr>
-          <p:cNvSpPr>
-            <a:spLocks noGrp="1"/>
-          </p:cNvSpPr>
-          <p:nvPr>
-            <p:ph idx="1"/>
-          </p:nvPr>
-        </p:nvSpPr>
-        <p:spPr/>
-        <p:txBody>
-          <a:bodyPr/>
-          <a:lstStyle/>
-          <a:p>
-            <a:endParaRPr lang="pl-PL"/>
-          </a:p>
-        </p:txBody>
-      </p:sp>
-    </p:spTree>
-    <p:extLst>
-      <p:ext uri="{BB962C8B-B14F-4D97-AF65-F5344CB8AC3E}">
-        <p14:creationId xmlns:p14="http://schemas.microsoft.com/office/powerpoint/2010/main" val="2836675616"/>
-      </p:ext>
-    </p:extLst>
-  </p:cSld>
-  <p:clrMapOvr>
-    <a:masterClrMapping/>
-  </p:clrMapOvr>
-</p:sld>
-</file>
-
-<file path=ppt/slides/slide7.xml><?xml version="1.0" encoding="utf-8"?>
-<p:sld xmlns:a="http://schemas.openxmlformats.org/drawingml/2006/main" xmlns:r="http://schemas.openxmlformats.org/officeDocument/2006/relationships" xmlns:p="http://schemas.openxmlformats.org/presentationml/2006/main">
-  <p:cSld>
     <p:bg>
       <p:bgPr>
         <a:blipFill>
-          <a:blip r:embed="rId2"/>
+          <a:blip r:embed="rId3"/>
           <a:stretch/>
         </a:blipFill>
         <a:effectLst/>
@@ -6855,7 +8110,7 @@
           <p:nvPr/>
         </p:nvPicPr>
         <p:blipFill>
-          <a:blip r:embed="rId3"/>
+          <a:blip r:embed="rId4"/>
           <a:stretch>
             <a:fillRect/>
           </a:stretch>
@@ -6980,7 +8235,7 @@
           <p:nvPr/>
         </p:nvPicPr>
         <p:blipFill>
-          <a:blip r:embed="rId4"/>
+          <a:blip r:embed="rId5"/>
           <a:stretch>
             <a:fillRect/>
           </a:stretch>
@@ -7212,7 +8467,7 @@
 </p:sld>
 </file>
 
-<file path=ppt/slides/slide8.xml><?xml version="1.0" encoding="utf-8"?>
+<file path=ppt/slides/slide7.xml><?xml version="1.0" encoding="utf-8"?>
 <p:sld xmlns:a="http://schemas.openxmlformats.org/drawingml/2006/main" xmlns:r="http://schemas.openxmlformats.org/officeDocument/2006/relationships" xmlns:p="http://schemas.openxmlformats.org/presentationml/2006/main">
   <p:cSld>
     <p:bg>
@@ -7543,6 +8798,90 @@
 </p:sld>
 </file>
 
+<file path=ppt/slides/slide8.xml><?xml version="1.0" encoding="utf-8"?>
+<p:sld xmlns:a="http://schemas.openxmlformats.org/drawingml/2006/main" xmlns:r="http://schemas.openxmlformats.org/officeDocument/2006/relationships" xmlns:p="http://schemas.openxmlformats.org/presentationml/2006/main">
+  <p:cSld>
+    <p:spTree>
+      <p:nvGrpSpPr>
+        <p:cNvPr id="1" name=""/>
+        <p:cNvGrpSpPr/>
+        <p:nvPr/>
+      </p:nvGrpSpPr>
+      <p:grpSpPr>
+        <a:xfrm>
+          <a:off x="0" y="0"/>
+          <a:ext cx="0" cy="0"/>
+          <a:chOff x="0" y="0"/>
+          <a:chExt cx="0" cy="0"/>
+        </a:xfrm>
+      </p:grpSpPr>
+      <p:sp>
+        <p:nvSpPr>
+          <p:cNvPr id="2" name="Tytuł 1">
+            <a:extLst>
+              <a:ext uri="{FF2B5EF4-FFF2-40B4-BE49-F238E27FC236}">
+                <a16:creationId xmlns:a16="http://schemas.microsoft.com/office/drawing/2014/main" id="{29F46AC4-BA6F-A08A-6674-307A9EF00EF0}"/>
+              </a:ext>
+            </a:extLst>
+          </p:cNvPr>
+          <p:cNvSpPr>
+            <a:spLocks noGrp="1"/>
+          </p:cNvSpPr>
+          <p:nvPr>
+            <p:ph type="title"/>
+          </p:nvPr>
+        </p:nvSpPr>
+        <p:spPr/>
+        <p:txBody>
+          <a:bodyPr/>
+          <a:lstStyle/>
+          <a:p>
+            <a:r>
+              <a:rPr lang="pl-PL" dirty="0" err="1"/>
+              <a:t>Voting</a:t>
+            </a:r>
+            <a:endParaRPr lang="pl-PL" dirty="0"/>
+          </a:p>
+        </p:txBody>
+      </p:sp>
+      <p:sp>
+        <p:nvSpPr>
+          <p:cNvPr id="3" name="Symbol zastępczy zawartości 2">
+            <a:extLst>
+              <a:ext uri="{FF2B5EF4-FFF2-40B4-BE49-F238E27FC236}">
+                <a16:creationId xmlns:a16="http://schemas.microsoft.com/office/drawing/2014/main" id="{C0CFB3F9-BCAD-4D2D-36AF-E76F7797DDB9}"/>
+              </a:ext>
+            </a:extLst>
+          </p:cNvPr>
+          <p:cNvSpPr>
+            <a:spLocks noGrp="1"/>
+          </p:cNvSpPr>
+          <p:nvPr>
+            <p:ph idx="1"/>
+          </p:nvPr>
+        </p:nvSpPr>
+        <p:spPr/>
+        <p:txBody>
+          <a:bodyPr/>
+          <a:lstStyle/>
+          <a:p>
+            <a:endParaRPr lang="pl-PL"/>
+          </a:p>
+        </p:txBody>
+      </p:sp>
+    </p:spTree>
+    <p:extLst>
+      <p:ext uri="{BB962C8B-B14F-4D97-AF65-F5344CB8AC3E}">
+        <p14:creationId xmlns:p14="http://schemas.microsoft.com/office/powerpoint/2010/main" val="3183681039"/>
+      </p:ext>
+    </p:extLst>
+  </p:cSld>
+  <p:clrMapOvr>
+    <a:masterClrMapping/>
+  </p:clrMapOvr>
+</p:sld>
+</file>
+
 <file path=ppt/slides/slide9.xml><?xml version="1.0" encoding="utf-8"?>
 <p:sld xmlns:a="http://schemas.openxmlformats.org/drawingml/2006/main" xmlns:r="http://schemas.openxmlformats.org/officeDocument/2006/relationships" xmlns:p="http://schemas.openxmlformats.org/presentationml/2006/main">
   <p:cSld>
@@ -7560,12 +8899,42 @@
           <a:chExt cx="0" cy="0"/>
         </a:xfrm>
       </p:grpSpPr>
+      <p:pic>
+        <p:nvPicPr>
+          <p:cNvPr id="5" name="Obraz 4">
+            <a:extLst>
+              <a:ext uri="{FF2B5EF4-FFF2-40B4-BE49-F238E27FC236}">
+                <a16:creationId xmlns:a16="http://schemas.microsoft.com/office/drawing/2014/main" id="{0B537E32-6110-FE0A-804D-7917885B6D46}"/>
+              </a:ext>
+            </a:extLst>
+          </p:cNvPr>
+          <p:cNvPicPr>
+            <a:picLocks noChangeAspect="1"/>
+          </p:cNvPicPr>
+          <p:nvPr/>
+        </p:nvPicPr>
+        <p:blipFill>
+          <a:blip r:embed="rId2"/>
+          <a:stretch>
+            <a:fillRect/>
+          </a:stretch>
+        </p:blipFill>
+        <p:spPr>
+          <a:xfrm>
+            <a:off x="6891586" y="282819"/>
+            <a:ext cx="5113602" cy="2902834"/>
+          </a:xfrm>
+          <a:prstGeom prst="rect">
+            <a:avLst/>
+          </a:prstGeom>
+        </p:spPr>
+      </p:pic>
       <p:sp>
         <p:nvSpPr>
           <p:cNvPr id="2" name="Tytuł 1">
             <a:extLst>
               <a:ext uri="{FF2B5EF4-FFF2-40B4-BE49-F238E27FC236}">
-                <a16:creationId xmlns:a16="http://schemas.microsoft.com/office/drawing/2014/main" id="{29F46AC4-BA6F-A08A-6674-307A9EF00EF0}"/>
+                <a16:creationId xmlns:a16="http://schemas.microsoft.com/office/drawing/2014/main" id="{2253E907-14CA-CB6D-1B74-CDAC7803A213}"/>
               </a:ext>
             </a:extLst>
           </p:cNvPr>
@@ -7583,7 +8952,15 @@
           <a:p>
             <a:r>
               <a:rPr lang="pl-PL" dirty="0" err="1"/>
-              <a:t>Voting</a:t>
+              <a:t>Feature</a:t>
+            </a:r>
+            <a:r>
+              <a:rPr lang="pl-PL" dirty="0"/>
+              <a:t> </a:t>
+            </a:r>
+            <a:r>
+              <a:rPr lang="pl-PL" dirty="0" err="1"/>
+              <a:t>importance</a:t>
             </a:r>
             <a:endParaRPr lang="pl-PL" dirty="0"/>
           </a:p>
@@ -7594,7 +8971,7 @@
           <p:cNvPr id="3" name="Symbol zastępczy zawartości 2">
             <a:extLst>
               <a:ext uri="{FF2B5EF4-FFF2-40B4-BE49-F238E27FC236}">
-                <a16:creationId xmlns:a16="http://schemas.microsoft.com/office/drawing/2014/main" id="{C0CFB3F9-BCAD-4D2D-36AF-E76F7797DDB9}"/>
+                <a16:creationId xmlns:a16="http://schemas.microsoft.com/office/drawing/2014/main" id="{AD2C7272-8288-8499-A6B6-60E89C986837}"/>
               </a:ext>
             </a:extLst>
           </p:cNvPr>
@@ -7605,19 +8982,58 @@
             <p:ph idx="1"/>
           </p:nvPr>
         </p:nvSpPr>
-        <p:spPr/>
+        <p:spPr>
+          <a:xfrm>
+            <a:off x="838200" y="1825625"/>
+            <a:ext cx="8324461" cy="4351338"/>
+          </a:xfrm>
+        </p:spPr>
         <p:txBody>
           <a:bodyPr/>
           <a:lstStyle/>
           <a:p>
-            <a:endParaRPr lang="pl-PL"/>
+            <a:r>
+              <a:rPr lang="pl-PL" dirty="0"/>
+              <a:t>Wykorzystując wytrenowany las losowy sprawdziliśmy </a:t>
+            </a:r>
+            <a:r>
+              <a:rPr lang="pl-PL" dirty="0" err="1"/>
+              <a:t>feature</a:t>
+            </a:r>
+            <a:r>
+              <a:rPr lang="pl-PL" dirty="0"/>
+              <a:t> </a:t>
+            </a:r>
+            <a:r>
+              <a:rPr lang="pl-PL" dirty="0" err="1"/>
+              <a:t>importance</a:t>
+            </a:r>
+            <a:endParaRPr lang="pl-PL" dirty="0"/>
+          </a:p>
+          <a:p>
+            <a:r>
+              <a:rPr lang="pl-PL" dirty="0"/>
+              <a:t>Na tym etapie udało się odkryć najbardziej predykcyjną cechę – brak danych w kolumnie </a:t>
+            </a:r>
+            <a:r>
+              <a:rPr lang="pl-PL" dirty="0" err="1">
+                <a:latin typeface="Consolas" panose="020B0609020204030204" pitchFamily="49" charset="0"/>
+              </a:rPr>
+              <a:t>WheelTypeID</a:t>
+            </a:r>
+            <a:endParaRPr lang="pl-PL" dirty="0">
+              <a:latin typeface="Consolas" panose="020B0609020204030204" pitchFamily="49" charset="0"/>
+            </a:endParaRPr>
+          </a:p>
+          <a:p>
+            <a:endParaRPr lang="pl-PL" dirty="0"/>
           </a:p>
         </p:txBody>
       </p:sp>
     </p:spTree>
     <p:extLst>
       <p:ext uri="{BB962C8B-B14F-4D97-AF65-F5344CB8AC3E}">
-        <p14:creationId xmlns:p14="http://schemas.microsoft.com/office/powerpoint/2010/main" val="3183681039"/>
+        <p14:creationId xmlns:p14="http://schemas.microsoft.com/office/powerpoint/2010/main" val="1595141374"/>
       </p:ext>
     </p:extLst>
   </p:cSld>
@@ -7874,4 +9290,299 @@
     </a:ext>
   </a:extLst>
 </a:theme>
+</file>
+
+<file path=ppt/theme/theme2.xml><?xml version="1.0" encoding="utf-8"?>
+<a:theme xmlns:a="http://schemas.openxmlformats.org/drawingml/2006/main" name="Motyw pakietu Office">
+  <a:themeElements>
+    <a:clrScheme name="Pakiet Office">
+      <a:dk1>
+        <a:sysClr val="windowText" lastClr="000000"/>
+      </a:dk1>
+      <a:lt1>
+        <a:sysClr val="window" lastClr="FFFFFF"/>
+      </a:lt1>
+      <a:dk2>
+        <a:srgbClr val="44546A"/>
+      </a:dk2>
+      <a:lt2>
+        <a:srgbClr val="E7E6E6"/>
+      </a:lt2>
+      <a:accent1>
+        <a:srgbClr val="4472C4"/>
+      </a:accent1>
+      <a:accent2>
+        <a:srgbClr val="ED7D31"/>
+      </a:accent2>
+      <a:accent3>
+        <a:srgbClr val="A5A5A5"/>
+      </a:accent3>
+      <a:accent4>
+        <a:srgbClr val="FFC000"/>
+      </a:accent4>
+      <a:accent5>
+        <a:srgbClr val="5B9BD5"/>
+      </a:accent5>
+      <a:accent6>
+        <a:srgbClr val="70AD47"/>
+      </a:accent6>
+      <a:hlink>
+        <a:srgbClr val="0563C1"/>
+      </a:hlink>
+      <a:folHlink>
+        <a:srgbClr val="954F72"/>
+      </a:folHlink>
+    </a:clrScheme>
+    <a:fontScheme name="Pakiet Office">
+      <a:majorFont>
+        <a:latin typeface="Calibri Light" panose="020F0302020204030204"/>
+        <a:ea typeface=""/>
+        <a:cs typeface=""/>
+        <a:font script="Jpan" typeface="游ゴシック Light"/>
+        <a:font script="Hang" typeface="맑은 고딕"/>
+        <a:font script="Hans" typeface="等线 Light"/>
+        <a:font script="Hant" typeface="新細明體"/>
+        <a:font script="Arab" typeface="Times New Roman"/>
+        <a:font script="Hebr" typeface="Times New Roman"/>
+        <a:font script="Thai" typeface="Angsana New"/>
+        <a:font script="Ethi" typeface="Nyala"/>
+        <a:font script="Beng" typeface="Vrinda"/>
+        <a:font script="Gujr" typeface="Shruti"/>
+        <a:font script="Khmr" typeface="MoolBoran"/>
+        <a:font script="Knda" typeface="Tunga"/>
+        <a:font script="Guru" typeface="Raavi"/>
+        <a:font script="Cans" typeface="Euphemia"/>
+        <a:font script="Cher" typeface="Plantagenet Cherokee"/>
+        <a:font script="Yiii" typeface="Microsoft Yi Baiti"/>
+        <a:font script="Tibt" typeface="Microsoft Himalaya"/>
+        <a:font script="Thaa" typeface="MV Boli"/>
+        <a:font script="Deva" typeface="Mangal"/>
+        <a:font script="Telu" typeface="Gautami"/>
+        <a:font script="Taml" typeface="Latha"/>
+        <a:font script="Syrc" typeface="Estrangelo Edessa"/>
+        <a:font script="Orya" typeface="Kalinga"/>
+        <a:font script="Mlym" typeface="Kartika"/>
+        <a:font script="Laoo" typeface="DokChampa"/>
+        <a:font script="Sinh" typeface="Iskoola Pota"/>
+        <a:font script="Mong" typeface="Mongolian Baiti"/>
+        <a:font script="Viet" typeface="Times New Roman"/>
+        <a:font script="Uigh" typeface="Microsoft Uighur"/>
+        <a:font script="Geor" typeface="Sylfaen"/>
+        <a:font script="Armn" typeface="Arial"/>
+        <a:font script="Bugi" typeface="Leelawadee UI"/>
+        <a:font script="Bopo" typeface="Microsoft JhengHei"/>
+        <a:font script="Java" typeface="Javanese Text"/>
+        <a:font script="Lisu" typeface="Segoe UI"/>
+        <a:font script="Mymr" typeface="Myanmar Text"/>
+        <a:font script="Nkoo" typeface="Ebrima"/>
+        <a:font script="Olck" typeface="Nirmala UI"/>
+        <a:font script="Osma" typeface="Ebrima"/>
+        <a:font script="Phag" typeface="Phagspa"/>
+        <a:font script="Syrn" typeface="Estrangelo Edessa"/>
+        <a:font script="Syrj" typeface="Estrangelo Edessa"/>
+        <a:font script="Syre" typeface="Estrangelo Edessa"/>
+        <a:font script="Sora" typeface="Nirmala UI"/>
+        <a:font script="Tale" typeface="Microsoft Tai Le"/>
+        <a:font script="Talu" typeface="Microsoft New Tai Lue"/>
+        <a:font script="Tfng" typeface="Ebrima"/>
+      </a:majorFont>
+      <a:minorFont>
+        <a:latin typeface="Calibri" panose="020F0502020204030204"/>
+        <a:ea typeface=""/>
+        <a:cs typeface=""/>
+        <a:font script="Jpan" typeface="游ゴシック"/>
+        <a:font script="Hang" typeface="맑은 고딕"/>
+        <a:font script="Hans" typeface="等线"/>
+        <a:font script="Hant" typeface="新細明體"/>
+        <a:font script="Arab" typeface="Arial"/>
+        <a:font script="Hebr" typeface="Arial"/>
+        <a:font script="Thai" typeface="Cordia New"/>
+        <a:font script="Ethi" typeface="Nyala"/>
+        <a:font script="Beng" typeface="Vrinda"/>
+        <a:font script="Gujr" typeface="Shruti"/>
+        <a:font script="Khmr" typeface="DaunPenh"/>
+        <a:font script="Knda" typeface="Tunga"/>
+        <a:font script="Guru" typeface="Raavi"/>
+        <a:font script="Cans" typeface="Euphemia"/>
+        <a:font script="Cher" typeface="Plantagenet Cherokee"/>
+        <a:font script="Yiii" typeface="Microsoft Yi Baiti"/>
+        <a:font script="Tibt" typeface="Microsoft Himalaya"/>
+        <a:font script="Thaa" typeface="MV Boli"/>
+        <a:font script="Deva" typeface="Mangal"/>
+        <a:font script="Telu" typeface="Gautami"/>
+        <a:font script="Taml" typeface="Latha"/>
+        <a:font script="Syrc" typeface="Estrangelo Edessa"/>
+        <a:font script="Orya" typeface="Kalinga"/>
+        <a:font script="Mlym" typeface="Kartika"/>
+        <a:font script="Laoo" typeface="DokChampa"/>
+        <a:font script="Sinh" typeface="Iskoola Pota"/>
+        <a:font script="Mong" typeface="Mongolian Baiti"/>
+        <a:font script="Viet" typeface="Arial"/>
+        <a:font script="Uigh" typeface="Microsoft Uighur"/>
+        <a:font script="Geor" typeface="Sylfaen"/>
+        <a:font script="Armn" typeface="Arial"/>
+        <a:font script="Bugi" typeface="Leelawadee UI"/>
+        <a:font script="Bopo" typeface="Microsoft JhengHei"/>
+        <a:font script="Java" typeface="Javanese Text"/>
+        <a:font script="Lisu" typeface="Segoe UI"/>
+        <a:font script="Mymr" typeface="Myanmar Text"/>
+        <a:font script="Nkoo" typeface="Ebrima"/>
+        <a:font script="Olck" typeface="Nirmala UI"/>
+        <a:font script="Osma" typeface="Ebrima"/>
+        <a:font script="Phag" typeface="Phagspa"/>
+        <a:font script="Syrn" typeface="Estrangelo Edessa"/>
+        <a:font script="Syrj" typeface="Estrangelo Edessa"/>
+        <a:font script="Syre" typeface="Estrangelo Edessa"/>
+        <a:font script="Sora" typeface="Nirmala UI"/>
+        <a:font script="Tale" typeface="Microsoft Tai Le"/>
+        <a:font script="Talu" typeface="Microsoft New Tai Lue"/>
+        <a:font script="Tfng" typeface="Ebrima"/>
+      </a:minorFont>
+    </a:fontScheme>
+    <a:fmtScheme name="Pakiet Office">
+      <a:fillStyleLst>
+        <a:solidFill>
+          <a:schemeClr val="phClr"/>
+        </a:solidFill>
+        <a:gradFill rotWithShape="1">
+          <a:gsLst>
+            <a:gs pos="0">
+              <a:schemeClr val="phClr">
+                <a:lumMod val="110000"/>
+                <a:satMod val="105000"/>
+                <a:tint val="67000"/>
+              </a:schemeClr>
+            </a:gs>
+            <a:gs pos="50000">
+              <a:schemeClr val="phClr">
+                <a:lumMod val="105000"/>
+                <a:satMod val="103000"/>
+                <a:tint val="73000"/>
+              </a:schemeClr>
+            </a:gs>
+            <a:gs pos="100000">
+              <a:schemeClr val="phClr">
+                <a:lumMod val="105000"/>
+                <a:satMod val="109000"/>
+                <a:tint val="81000"/>
+              </a:schemeClr>
+            </a:gs>
+          </a:gsLst>
+          <a:lin ang="5400000" scaled="0"/>
+        </a:gradFill>
+        <a:gradFill rotWithShape="1">
+          <a:gsLst>
+            <a:gs pos="0">
+              <a:schemeClr val="phClr">
+                <a:satMod val="103000"/>
+                <a:lumMod val="102000"/>
+                <a:tint val="94000"/>
+              </a:schemeClr>
+            </a:gs>
+            <a:gs pos="50000">
+              <a:schemeClr val="phClr">
+                <a:satMod val="110000"/>
+                <a:lumMod val="100000"/>
+                <a:shade val="100000"/>
+              </a:schemeClr>
+            </a:gs>
+            <a:gs pos="100000">
+              <a:schemeClr val="phClr">
+                <a:lumMod val="99000"/>
+                <a:satMod val="120000"/>
+                <a:shade val="78000"/>
+              </a:schemeClr>
+            </a:gs>
+          </a:gsLst>
+          <a:lin ang="5400000" scaled="0"/>
+        </a:gradFill>
+      </a:fillStyleLst>
+      <a:lnStyleLst>
+        <a:ln w="6350" cap="flat" cmpd="sng" algn="ctr">
+          <a:solidFill>
+            <a:schemeClr val="phClr"/>
+          </a:solidFill>
+          <a:prstDash val="solid"/>
+          <a:miter lim="800000"/>
+        </a:ln>
+        <a:ln w="12700" cap="flat" cmpd="sng" algn="ctr">
+          <a:solidFill>
+            <a:schemeClr val="phClr"/>
+          </a:solidFill>
+          <a:prstDash val="solid"/>
+          <a:miter lim="800000"/>
+        </a:ln>
+        <a:ln w="19050" cap="flat" cmpd="sng" algn="ctr">
+          <a:solidFill>
+            <a:schemeClr val="phClr"/>
+          </a:solidFill>
+          <a:prstDash val="solid"/>
+          <a:miter lim="800000"/>
+        </a:ln>
+      </a:lnStyleLst>
+      <a:effectStyleLst>
+        <a:effectStyle>
+          <a:effectLst/>
+        </a:effectStyle>
+        <a:effectStyle>
+          <a:effectLst/>
+        </a:effectStyle>
+        <a:effectStyle>
+          <a:effectLst>
+            <a:outerShdw blurRad="57150" dist="19050" dir="5400000" algn="ctr" rotWithShape="0">
+              <a:srgbClr val="000000">
+                <a:alpha val="63000"/>
+              </a:srgbClr>
+            </a:outerShdw>
+          </a:effectLst>
+        </a:effectStyle>
+      </a:effectStyleLst>
+      <a:bgFillStyleLst>
+        <a:solidFill>
+          <a:schemeClr val="phClr"/>
+        </a:solidFill>
+        <a:solidFill>
+          <a:schemeClr val="phClr">
+            <a:tint val="95000"/>
+            <a:satMod val="170000"/>
+          </a:schemeClr>
+        </a:solidFill>
+        <a:gradFill rotWithShape="1">
+          <a:gsLst>
+            <a:gs pos="0">
+              <a:schemeClr val="phClr">
+                <a:tint val="93000"/>
+                <a:satMod val="150000"/>
+                <a:shade val="98000"/>
+                <a:lumMod val="102000"/>
+              </a:schemeClr>
+            </a:gs>
+            <a:gs pos="50000">
+              <a:schemeClr val="phClr">
+                <a:tint val="98000"/>
+                <a:satMod val="130000"/>
+                <a:shade val="90000"/>
+                <a:lumMod val="103000"/>
+              </a:schemeClr>
+            </a:gs>
+            <a:gs pos="100000">
+              <a:schemeClr val="phClr">
+                <a:shade val="63000"/>
+                <a:satMod val="120000"/>
+              </a:schemeClr>
+            </a:gs>
+          </a:gsLst>
+          <a:lin ang="5400000" scaled="0"/>
+        </a:gradFill>
+      </a:bgFillStyleLst>
+    </a:fmtScheme>
+  </a:themeElements>
+  <a:objectDefaults/>
+  <a:extraClrSchemeLst/>
+  <a:extLst>
+    <a:ext uri="{05A4C25C-085E-4340-85A3-A5531E510DB2}">
+      <thm15:themeFamily xmlns:thm15="http://schemas.microsoft.com/office/thememl/2012/main" name="Office Theme" id="{62F939B6-93AF-4DB8-9C6B-D6C7DFDC589F}" vid="{4A3C46E8-61CC-4603-A589-7422A47A8E4A}"/>
+    </a:ext>
+  </a:extLst>
+</a:theme>
 </file>
</xml_diff>